<commit_message>
Updates to settings, output, and images for reportBiomass_2407RL.
</commit_message>
<xml_diff>
--- a/Images/mft_schematics.pptx
+++ b/Images/mft_schematics.pptx
@@ -271,7 +271,7 @@
           <a:p>
             <a:fld id="{837539DB-F57F-4D57-9614-9856B8833FF9}" type="datetimeFigureOut">
               <a:rPr lang="en-US" smtClean="0"/>
-              <a:t>10/7/2024</a:t>
+              <a:t>10/23/2024</a:t>
             </a:fld>
             <a:endParaRPr lang="en-US"/>
           </a:p>
@@ -469,7 +469,7 @@
           <a:p>
             <a:fld id="{837539DB-F57F-4D57-9614-9856B8833FF9}" type="datetimeFigureOut">
               <a:rPr lang="en-US" smtClean="0"/>
-              <a:t>10/7/2024</a:t>
+              <a:t>10/23/2024</a:t>
             </a:fld>
             <a:endParaRPr lang="en-US"/>
           </a:p>
@@ -677,7 +677,7 @@
           <a:p>
             <a:fld id="{837539DB-F57F-4D57-9614-9856B8833FF9}" type="datetimeFigureOut">
               <a:rPr lang="en-US" smtClean="0"/>
-              <a:t>10/7/2024</a:t>
+              <a:t>10/23/2024</a:t>
             </a:fld>
             <a:endParaRPr lang="en-US"/>
           </a:p>
@@ -875,7 +875,7 @@
           <a:p>
             <a:fld id="{837539DB-F57F-4D57-9614-9856B8833FF9}" type="datetimeFigureOut">
               <a:rPr lang="en-US" smtClean="0"/>
-              <a:t>10/7/2024</a:t>
+              <a:t>10/23/2024</a:t>
             </a:fld>
             <a:endParaRPr lang="en-US"/>
           </a:p>
@@ -1150,7 +1150,7 @@
           <a:p>
             <a:fld id="{837539DB-F57F-4D57-9614-9856B8833FF9}" type="datetimeFigureOut">
               <a:rPr lang="en-US" smtClean="0"/>
-              <a:t>10/7/2024</a:t>
+              <a:t>10/23/2024</a:t>
             </a:fld>
             <a:endParaRPr lang="en-US"/>
           </a:p>
@@ -1415,7 +1415,7 @@
           <a:p>
             <a:fld id="{837539DB-F57F-4D57-9614-9856B8833FF9}" type="datetimeFigureOut">
               <a:rPr lang="en-US" smtClean="0"/>
-              <a:t>10/7/2024</a:t>
+              <a:t>10/23/2024</a:t>
             </a:fld>
             <a:endParaRPr lang="en-US"/>
           </a:p>
@@ -1827,7 +1827,7 @@
           <a:p>
             <a:fld id="{837539DB-F57F-4D57-9614-9856B8833FF9}" type="datetimeFigureOut">
               <a:rPr lang="en-US" smtClean="0"/>
-              <a:t>10/7/2024</a:t>
+              <a:t>10/23/2024</a:t>
             </a:fld>
             <a:endParaRPr lang="en-US"/>
           </a:p>
@@ -1968,7 +1968,7 @@
           <a:p>
             <a:fld id="{837539DB-F57F-4D57-9614-9856B8833FF9}" type="datetimeFigureOut">
               <a:rPr lang="en-US" smtClean="0"/>
-              <a:t>10/7/2024</a:t>
+              <a:t>10/23/2024</a:t>
             </a:fld>
             <a:endParaRPr lang="en-US"/>
           </a:p>
@@ -2081,7 +2081,7 @@
           <a:p>
             <a:fld id="{837539DB-F57F-4D57-9614-9856B8833FF9}" type="datetimeFigureOut">
               <a:rPr lang="en-US" smtClean="0"/>
-              <a:t>10/7/2024</a:t>
+              <a:t>10/23/2024</a:t>
             </a:fld>
             <a:endParaRPr lang="en-US"/>
           </a:p>
@@ -2392,7 +2392,7 @@
           <a:p>
             <a:fld id="{837539DB-F57F-4D57-9614-9856B8833FF9}" type="datetimeFigureOut">
               <a:rPr lang="en-US" smtClean="0"/>
-              <a:t>10/7/2024</a:t>
+              <a:t>10/23/2024</a:t>
             </a:fld>
             <a:endParaRPr lang="en-US"/>
           </a:p>
@@ -2680,7 +2680,7 @@
           <a:p>
             <a:fld id="{837539DB-F57F-4D57-9614-9856B8833FF9}" type="datetimeFigureOut">
               <a:rPr lang="en-US" smtClean="0"/>
-              <a:t>10/7/2024</a:t>
+              <a:t>10/23/2024</a:t>
             </a:fld>
             <a:endParaRPr lang="en-US"/>
           </a:p>
@@ -2921,7 +2921,7 @@
           <a:p>
             <a:fld id="{837539DB-F57F-4D57-9614-9856B8833FF9}" type="datetimeFigureOut">
               <a:rPr lang="en-US" smtClean="0"/>
-              <a:t>10/7/2024</a:t>
+              <a:t>10/23/2024</a:t>
             </a:fld>
             <a:endParaRPr lang="en-US"/>
           </a:p>
@@ -3340,10 +3340,10 @@
       </p:grpSpPr>
       <p:grpSp>
         <p:nvGrpSpPr>
-          <p:cNvPr id="24" name="Group 23">
-            <a:extLst>
-              <a:ext uri="{FF2B5EF4-FFF2-40B4-BE49-F238E27FC236}">
-                <a16:creationId xmlns:a16="http://schemas.microsoft.com/office/drawing/2014/main" id="{A1133DDA-A122-4175-A2ED-2F4CDFE823E1}"/>
+          <p:cNvPr id="3" name="Group 2">
+            <a:extLst>
+              <a:ext uri="{FF2B5EF4-FFF2-40B4-BE49-F238E27FC236}">
+                <a16:creationId xmlns:a16="http://schemas.microsoft.com/office/drawing/2014/main" id="{10E34780-B297-45A2-8C47-8E936324A81C}"/>
               </a:ext>
             </a:extLst>
           </p:cNvPr>
@@ -3352,18 +3352,18 @@
         </p:nvGrpSpPr>
         <p:grpSpPr>
           <a:xfrm>
-            <a:off x="466532" y="203808"/>
-            <a:ext cx="11262045" cy="6430254"/>
-            <a:chOff x="1268968" y="784228"/>
-            <a:chExt cx="9284373" cy="5301069"/>
+            <a:off x="460472" y="112567"/>
+            <a:ext cx="11268105" cy="6521495"/>
+            <a:chOff x="460472" y="112567"/>
+            <a:chExt cx="11268105" cy="6521495"/>
           </a:xfrm>
         </p:grpSpPr>
         <p:grpSp>
           <p:nvGrpSpPr>
-            <p:cNvPr id="18" name="Group 17">
+            <p:cNvPr id="24" name="Group 23">
               <a:extLst>
                 <a:ext uri="{FF2B5EF4-FFF2-40B4-BE49-F238E27FC236}">
-                  <a16:creationId xmlns:a16="http://schemas.microsoft.com/office/drawing/2014/main" id="{612D3E0D-1B5A-4411-A639-8A91D9DD40DC}"/>
+                  <a16:creationId xmlns:a16="http://schemas.microsoft.com/office/drawing/2014/main" id="{A1133DDA-A122-4175-A2ED-2F4CDFE823E1}"/>
                 </a:ext>
               </a:extLst>
             </p:cNvPr>
@@ -3372,18 +3372,687 @@
           </p:nvGrpSpPr>
           <p:grpSpPr>
             <a:xfrm>
-              <a:off x="1268968" y="790907"/>
-              <a:ext cx="3181452" cy="5287711"/>
-              <a:chOff x="363895" y="790907"/>
-              <a:chExt cx="3181452" cy="5287711"/>
+              <a:off x="466532" y="203808"/>
+              <a:ext cx="11262045" cy="6430254"/>
+              <a:chOff x="1268968" y="784228"/>
+              <a:chExt cx="9284373" cy="5301069"/>
+            </a:xfrm>
+          </p:grpSpPr>
+          <p:grpSp>
+            <p:nvGrpSpPr>
+              <p:cNvPr id="18" name="Group 17">
+                <a:extLst>
+                  <a:ext uri="{FF2B5EF4-FFF2-40B4-BE49-F238E27FC236}">
+                    <a16:creationId xmlns:a16="http://schemas.microsoft.com/office/drawing/2014/main" id="{612D3E0D-1B5A-4411-A639-8A91D9DD40DC}"/>
+                  </a:ext>
+                </a:extLst>
+              </p:cNvPr>
+              <p:cNvGrpSpPr/>
+              <p:nvPr/>
+            </p:nvGrpSpPr>
+            <p:grpSpPr>
+              <a:xfrm>
+                <a:off x="1268968" y="790907"/>
+                <a:ext cx="3181452" cy="5287711"/>
+                <a:chOff x="363895" y="790907"/>
+                <a:chExt cx="3181452" cy="5287711"/>
+              </a:xfrm>
+            </p:grpSpPr>
+            <p:pic>
+              <p:nvPicPr>
+                <p:cNvPr id="5" name="Picture 4">
+                  <a:extLst>
+                    <a:ext uri="{FF2B5EF4-FFF2-40B4-BE49-F238E27FC236}">
+                      <a16:creationId xmlns:a16="http://schemas.microsoft.com/office/drawing/2014/main" id="{9BE8C483-620C-45E7-87BC-2E8D3F49C112}"/>
+                    </a:ext>
+                  </a:extLst>
+                </p:cNvPr>
+                <p:cNvPicPr>
+                  <a:picLocks noChangeAspect="1"/>
+                </p:cNvPicPr>
+                <p:nvPr/>
+              </p:nvPicPr>
+              <p:blipFill rotWithShape="1">
+                <a:blip r:embed="rId2">
+                  <a:extLst>
+                    <a:ext uri="{28A0092B-C50C-407E-A947-70E740481C1C}">
+                      <a14:useLocalDpi xmlns:a14="http://schemas.microsoft.com/office/drawing/2010/main" val="0"/>
+                    </a:ext>
+                  </a:extLst>
+                </a:blip>
+                <a:srcRect l="8945" r="12851"/>
+                <a:stretch/>
+              </p:blipFill>
+              <p:spPr>
+                <a:xfrm>
+                  <a:off x="363895" y="802432"/>
+                  <a:ext cx="3181452" cy="5264661"/>
+                </a:xfrm>
+                <a:prstGeom prst="rect">
+                  <a:avLst/>
+                </a:prstGeom>
+              </p:spPr>
+            </p:pic>
+            <p:sp>
+              <p:nvSpPr>
+                <p:cNvPr id="12" name="Rectangle 11">
+                  <a:extLst>
+                    <a:ext uri="{FF2B5EF4-FFF2-40B4-BE49-F238E27FC236}">
+                      <a16:creationId xmlns:a16="http://schemas.microsoft.com/office/drawing/2014/main" id="{E74F6D24-2B56-4B6E-A9B2-B899F17A0F4E}"/>
+                    </a:ext>
+                  </a:extLst>
+                </p:cNvPr>
+                <p:cNvSpPr/>
+                <p:nvPr/>
+              </p:nvSpPr>
+              <p:spPr>
+                <a:xfrm>
+                  <a:off x="1446245" y="790907"/>
+                  <a:ext cx="2071396" cy="216799"/>
+                </a:xfrm>
+                <a:prstGeom prst="rect">
+                  <a:avLst/>
+                </a:prstGeom>
+                <a:solidFill>
+                  <a:schemeClr val="bg1"/>
+                </a:solidFill>
+                <a:ln>
+                  <a:solidFill>
+                    <a:schemeClr val="bg1"/>
+                  </a:solidFill>
+                </a:ln>
+              </p:spPr>
+              <p:style>
+                <a:lnRef idx="2">
+                  <a:schemeClr val="accent1">
+                    <a:shade val="50000"/>
+                  </a:schemeClr>
+                </a:lnRef>
+                <a:fillRef idx="1">
+                  <a:schemeClr val="accent1"/>
+                </a:fillRef>
+                <a:effectRef idx="0">
+                  <a:schemeClr val="accent1"/>
+                </a:effectRef>
+                <a:fontRef idx="minor">
+                  <a:schemeClr val="lt1"/>
+                </a:fontRef>
+              </p:style>
+              <p:txBody>
+                <a:bodyPr rtlCol="0" anchor="ctr"/>
+                <a:lstStyle/>
+                <a:p>
+                  <a:pPr algn="ctr"/>
+                  <a:endParaRPr lang="en-US"/>
+                </a:p>
+              </p:txBody>
+            </p:sp>
+            <p:sp>
+              <p:nvSpPr>
+                <p:cNvPr id="15" name="Rectangle 14">
+                  <a:extLst>
+                    <a:ext uri="{FF2B5EF4-FFF2-40B4-BE49-F238E27FC236}">
+                      <a16:creationId xmlns:a16="http://schemas.microsoft.com/office/drawing/2014/main" id="{5D73DE50-B27C-47C6-BF50-CC6BEAEA7B67}"/>
+                    </a:ext>
+                  </a:extLst>
+                </p:cNvPr>
+                <p:cNvSpPr/>
+                <p:nvPr/>
+              </p:nvSpPr>
+              <p:spPr>
+                <a:xfrm>
+                  <a:off x="1044886" y="5508171"/>
+                  <a:ext cx="1073163" cy="570447"/>
+                </a:xfrm>
+                <a:prstGeom prst="rect">
+                  <a:avLst/>
+                </a:prstGeom>
+                <a:solidFill>
+                  <a:schemeClr val="bg1"/>
+                </a:solidFill>
+                <a:ln>
+                  <a:solidFill>
+                    <a:schemeClr val="bg1"/>
+                  </a:solidFill>
+                </a:ln>
+              </p:spPr>
+              <p:style>
+                <a:lnRef idx="2">
+                  <a:schemeClr val="accent1">
+                    <a:shade val="50000"/>
+                  </a:schemeClr>
+                </a:lnRef>
+                <a:fillRef idx="1">
+                  <a:schemeClr val="accent1"/>
+                </a:fillRef>
+                <a:effectRef idx="0">
+                  <a:schemeClr val="accent1"/>
+                </a:effectRef>
+                <a:fontRef idx="minor">
+                  <a:schemeClr val="lt1"/>
+                </a:fontRef>
+              </p:style>
+              <p:txBody>
+                <a:bodyPr rtlCol="0" anchor="ctr"/>
+                <a:lstStyle/>
+                <a:p>
+                  <a:pPr algn="ctr"/>
+                  <a:endParaRPr lang="en-US"/>
+                </a:p>
+              </p:txBody>
+            </p:sp>
+          </p:grpSp>
+          <p:grpSp>
+            <p:nvGrpSpPr>
+              <p:cNvPr id="20" name="Group 19">
+                <a:extLst>
+                  <a:ext uri="{FF2B5EF4-FFF2-40B4-BE49-F238E27FC236}">
+                    <a16:creationId xmlns:a16="http://schemas.microsoft.com/office/drawing/2014/main" id="{9A0F5850-C511-4E4F-878F-5D407AD76F2D}"/>
+                  </a:ext>
+                </a:extLst>
+              </p:cNvPr>
+              <p:cNvGrpSpPr/>
+              <p:nvPr/>
+            </p:nvGrpSpPr>
+            <p:grpSpPr>
+              <a:xfrm>
+                <a:off x="7623098" y="790907"/>
+                <a:ext cx="2930243" cy="5276186"/>
+                <a:chOff x="8696130" y="790907"/>
+                <a:chExt cx="2930243" cy="5276186"/>
+              </a:xfrm>
+            </p:grpSpPr>
+            <p:pic>
+              <p:nvPicPr>
+                <p:cNvPr id="9" name="Picture 8">
+                  <a:extLst>
+                    <a:ext uri="{FF2B5EF4-FFF2-40B4-BE49-F238E27FC236}">
+                      <a16:creationId xmlns:a16="http://schemas.microsoft.com/office/drawing/2014/main" id="{5C2B6F29-C485-48A5-A8FB-0404DF95703E}"/>
+                    </a:ext>
+                  </a:extLst>
+                </p:cNvPr>
+                <p:cNvPicPr>
+                  <a:picLocks noChangeAspect="1"/>
+                </p:cNvPicPr>
+                <p:nvPr/>
+              </p:nvPicPr>
+              <p:blipFill rotWithShape="1">
+                <a:blip r:embed="rId3">
+                  <a:extLst>
+                    <a:ext uri="{28A0092B-C50C-407E-A947-70E740481C1C}">
+                      <a14:useLocalDpi xmlns:a14="http://schemas.microsoft.com/office/drawing/2010/main" val="0"/>
+                    </a:ext>
+                  </a:extLst>
+                </a:blip>
+                <a:srcRect l="14213" r="13758"/>
+                <a:stretch/>
+              </p:blipFill>
+              <p:spPr>
+                <a:xfrm>
+                  <a:off x="8696130" y="802432"/>
+                  <a:ext cx="2930243" cy="5264661"/>
+                </a:xfrm>
+                <a:prstGeom prst="rect">
+                  <a:avLst/>
+                </a:prstGeom>
+              </p:spPr>
+            </p:pic>
+            <p:sp>
+              <p:nvSpPr>
+                <p:cNvPr id="13" name="Rectangle 12">
+                  <a:extLst>
+                    <a:ext uri="{FF2B5EF4-FFF2-40B4-BE49-F238E27FC236}">
+                      <a16:creationId xmlns:a16="http://schemas.microsoft.com/office/drawing/2014/main" id="{A6F8BCA5-F1A3-4775-AE51-A4478CFC9750}"/>
+                    </a:ext>
+                  </a:extLst>
+                </p:cNvPr>
+                <p:cNvSpPr/>
+                <p:nvPr/>
+              </p:nvSpPr>
+              <p:spPr>
+                <a:xfrm>
+                  <a:off x="9554977" y="790907"/>
+                  <a:ext cx="2071396" cy="216799"/>
+                </a:xfrm>
+                <a:prstGeom prst="rect">
+                  <a:avLst/>
+                </a:prstGeom>
+                <a:solidFill>
+                  <a:schemeClr val="bg1"/>
+                </a:solidFill>
+                <a:ln>
+                  <a:solidFill>
+                    <a:schemeClr val="bg1"/>
+                  </a:solidFill>
+                </a:ln>
+              </p:spPr>
+              <p:style>
+                <a:lnRef idx="2">
+                  <a:schemeClr val="accent1">
+                    <a:shade val="50000"/>
+                  </a:schemeClr>
+                </a:lnRef>
+                <a:fillRef idx="1">
+                  <a:schemeClr val="accent1"/>
+                </a:fillRef>
+                <a:effectRef idx="0">
+                  <a:schemeClr val="accent1"/>
+                </a:effectRef>
+                <a:fontRef idx="minor">
+                  <a:schemeClr val="lt1"/>
+                </a:fontRef>
+              </p:style>
+              <p:txBody>
+                <a:bodyPr rtlCol="0" anchor="ctr"/>
+                <a:lstStyle/>
+                <a:p>
+                  <a:pPr algn="ctr"/>
+                  <a:endParaRPr lang="en-US"/>
+                </a:p>
+              </p:txBody>
+            </p:sp>
+            <p:sp>
+              <p:nvSpPr>
+                <p:cNvPr id="16" name="Rectangle 15">
+                  <a:extLst>
+                    <a:ext uri="{FF2B5EF4-FFF2-40B4-BE49-F238E27FC236}">
+                      <a16:creationId xmlns:a16="http://schemas.microsoft.com/office/drawing/2014/main" id="{48F3BB1C-6B0C-4997-8A81-E1D11353E9DD}"/>
+                    </a:ext>
+                  </a:extLst>
+                </p:cNvPr>
+                <p:cNvSpPr/>
+                <p:nvPr/>
+              </p:nvSpPr>
+              <p:spPr>
+                <a:xfrm>
+                  <a:off x="9352241" y="5561045"/>
+                  <a:ext cx="986077" cy="475861"/>
+                </a:xfrm>
+                <a:prstGeom prst="rect">
+                  <a:avLst/>
+                </a:prstGeom>
+                <a:solidFill>
+                  <a:schemeClr val="bg1"/>
+                </a:solidFill>
+                <a:ln>
+                  <a:solidFill>
+                    <a:schemeClr val="bg1"/>
+                  </a:solidFill>
+                </a:ln>
+              </p:spPr>
+              <p:style>
+                <a:lnRef idx="2">
+                  <a:schemeClr val="accent1">
+                    <a:shade val="50000"/>
+                  </a:schemeClr>
+                </a:lnRef>
+                <a:fillRef idx="1">
+                  <a:schemeClr val="accent1"/>
+                </a:fillRef>
+                <a:effectRef idx="0">
+                  <a:schemeClr val="accent1"/>
+                </a:effectRef>
+                <a:fontRef idx="minor">
+                  <a:schemeClr val="lt1"/>
+                </a:fontRef>
+              </p:style>
+              <p:txBody>
+                <a:bodyPr rtlCol="0" anchor="ctr"/>
+                <a:lstStyle/>
+                <a:p>
+                  <a:pPr algn="ctr"/>
+                  <a:endParaRPr lang="en-US"/>
+                </a:p>
+              </p:txBody>
+            </p:sp>
+          </p:grpSp>
+          <p:grpSp>
+            <p:nvGrpSpPr>
+              <p:cNvPr id="19" name="Group 18">
+                <a:extLst>
+                  <a:ext uri="{FF2B5EF4-FFF2-40B4-BE49-F238E27FC236}">
+                    <a16:creationId xmlns:a16="http://schemas.microsoft.com/office/drawing/2014/main" id="{EFE3D198-0CE9-43F8-9070-301002DFCD8F}"/>
+                  </a:ext>
+                </a:extLst>
+              </p:cNvPr>
+              <p:cNvGrpSpPr/>
+              <p:nvPr/>
+            </p:nvGrpSpPr>
+            <p:grpSpPr>
+              <a:xfrm>
+                <a:off x="4450702" y="784228"/>
+                <a:ext cx="3181453" cy="5301069"/>
+                <a:chOff x="4450702" y="784228"/>
+                <a:chExt cx="3181453" cy="5301069"/>
+              </a:xfrm>
+            </p:grpSpPr>
+            <p:pic>
+              <p:nvPicPr>
+                <p:cNvPr id="7" name="Picture 6">
+                  <a:extLst>
+                    <a:ext uri="{FF2B5EF4-FFF2-40B4-BE49-F238E27FC236}">
+                      <a16:creationId xmlns:a16="http://schemas.microsoft.com/office/drawing/2014/main" id="{E3372117-6F5F-4FB2-9D1E-9068A4286B12}"/>
+                    </a:ext>
+                  </a:extLst>
+                </p:cNvPr>
+                <p:cNvPicPr>
+                  <a:picLocks noChangeAspect="1"/>
+                </p:cNvPicPr>
+                <p:nvPr/>
+              </p:nvPicPr>
+              <p:blipFill rotWithShape="1">
+                <a:blip r:embed="rId4">
+                  <a:extLst>
+                    <a:ext uri="{28A0092B-C50C-407E-A947-70E740481C1C}">
+                      <a14:useLocalDpi xmlns:a14="http://schemas.microsoft.com/office/drawing/2010/main" val="0"/>
+                    </a:ext>
+                  </a:extLst>
+                </a:blip>
+                <a:srcRect l="9630" r="12167"/>
+                <a:stretch/>
+              </p:blipFill>
+              <p:spPr>
+                <a:xfrm>
+                  <a:off x="4450702" y="802432"/>
+                  <a:ext cx="3181453" cy="5264661"/>
+                </a:xfrm>
+                <a:prstGeom prst="rect">
+                  <a:avLst/>
+                </a:prstGeom>
+              </p:spPr>
+            </p:pic>
+            <p:sp>
+              <p:nvSpPr>
+                <p:cNvPr id="14" name="Rectangle 13">
+                  <a:extLst>
+                    <a:ext uri="{FF2B5EF4-FFF2-40B4-BE49-F238E27FC236}">
+                      <a16:creationId xmlns:a16="http://schemas.microsoft.com/office/drawing/2014/main" id="{ABEA1C05-4EC4-466C-9D9F-9FB2AC52530C}"/>
+                    </a:ext>
+                  </a:extLst>
+                </p:cNvPr>
+                <p:cNvSpPr/>
+                <p:nvPr/>
+              </p:nvSpPr>
+              <p:spPr>
+                <a:xfrm>
+                  <a:off x="5496017" y="784228"/>
+                  <a:ext cx="2071396" cy="216799"/>
+                </a:xfrm>
+                <a:prstGeom prst="rect">
+                  <a:avLst/>
+                </a:prstGeom>
+                <a:solidFill>
+                  <a:schemeClr val="bg1"/>
+                </a:solidFill>
+                <a:ln>
+                  <a:solidFill>
+                    <a:schemeClr val="bg1"/>
+                  </a:solidFill>
+                </a:ln>
+              </p:spPr>
+              <p:style>
+                <a:lnRef idx="2">
+                  <a:schemeClr val="accent1">
+                    <a:shade val="50000"/>
+                  </a:schemeClr>
+                </a:lnRef>
+                <a:fillRef idx="1">
+                  <a:schemeClr val="accent1"/>
+                </a:fillRef>
+                <a:effectRef idx="0">
+                  <a:schemeClr val="accent1"/>
+                </a:effectRef>
+                <a:fontRef idx="minor">
+                  <a:schemeClr val="lt1"/>
+                </a:fontRef>
+              </p:style>
+              <p:txBody>
+                <a:bodyPr rtlCol="0" anchor="ctr"/>
+                <a:lstStyle/>
+                <a:p>
+                  <a:pPr algn="ctr"/>
+                  <a:endParaRPr lang="en-US"/>
+                </a:p>
+              </p:txBody>
+            </p:sp>
+            <p:sp>
+              <p:nvSpPr>
+                <p:cNvPr id="17" name="Rectangle 16">
+                  <a:extLst>
+                    <a:ext uri="{FF2B5EF4-FFF2-40B4-BE49-F238E27FC236}">
+                      <a16:creationId xmlns:a16="http://schemas.microsoft.com/office/drawing/2014/main" id="{7215AE6B-75C9-42DA-BD49-3E9576AB0E84}"/>
+                    </a:ext>
+                  </a:extLst>
+                </p:cNvPr>
+                <p:cNvSpPr/>
+                <p:nvPr/>
+              </p:nvSpPr>
+              <p:spPr>
+                <a:xfrm>
+                  <a:off x="5094514" y="5551714"/>
+                  <a:ext cx="979716" cy="533583"/>
+                </a:xfrm>
+                <a:prstGeom prst="rect">
+                  <a:avLst/>
+                </a:prstGeom>
+                <a:solidFill>
+                  <a:schemeClr val="bg1"/>
+                </a:solidFill>
+                <a:ln>
+                  <a:solidFill>
+                    <a:schemeClr val="bg1"/>
+                  </a:solidFill>
+                </a:ln>
+              </p:spPr>
+              <p:style>
+                <a:lnRef idx="2">
+                  <a:schemeClr val="accent1">
+                    <a:shade val="50000"/>
+                  </a:schemeClr>
+                </a:lnRef>
+                <a:fillRef idx="1">
+                  <a:schemeClr val="accent1"/>
+                </a:fillRef>
+                <a:effectRef idx="0">
+                  <a:schemeClr val="accent1"/>
+                </a:effectRef>
+                <a:fontRef idx="minor">
+                  <a:schemeClr val="lt1"/>
+                </a:fontRef>
+              </p:style>
+              <p:txBody>
+                <a:bodyPr rtlCol="0" anchor="ctr"/>
+                <a:lstStyle/>
+                <a:p>
+                  <a:pPr algn="ctr"/>
+                  <a:endParaRPr lang="en-US"/>
+                </a:p>
+              </p:txBody>
+            </p:sp>
+          </p:grpSp>
+        </p:grpSp>
+        <p:sp>
+          <p:nvSpPr>
+            <p:cNvPr id="2" name="TextBox 1">
+              <a:extLst>
+                <a:ext uri="{FF2B5EF4-FFF2-40B4-BE49-F238E27FC236}">
+                  <a16:creationId xmlns:a16="http://schemas.microsoft.com/office/drawing/2014/main" id="{F8212DB4-1FD7-4484-B778-F8D7A83C517C}"/>
+                </a:ext>
+              </a:extLst>
+            </p:cNvPr>
+            <p:cNvSpPr txBox="1"/>
+            <p:nvPr/>
+          </p:nvSpPr>
+          <p:spPr>
+            <a:xfrm>
+              <a:off x="460472" y="112567"/>
+              <a:ext cx="433132" cy="461665"/>
+            </a:xfrm>
+            <a:prstGeom prst="rect">
+              <a:avLst/>
+            </a:prstGeom>
+            <a:noFill/>
+          </p:spPr>
+          <p:txBody>
+            <a:bodyPr wrap="none" rtlCol="0">
+              <a:spAutoFit/>
+            </a:bodyPr>
+            <a:lstStyle/>
+            <a:p>
+              <a:r>
+                <a:rPr lang="en-US" sz="2400" b="1" dirty="0"/>
+                <a:t>a)</a:t>
+              </a:r>
+            </a:p>
+          </p:txBody>
+        </p:sp>
+        <p:sp>
+          <p:nvSpPr>
+            <p:cNvPr id="21" name="TextBox 20">
+              <a:extLst>
+                <a:ext uri="{FF2B5EF4-FFF2-40B4-BE49-F238E27FC236}">
+                  <a16:creationId xmlns:a16="http://schemas.microsoft.com/office/drawing/2014/main" id="{029B6F72-CF53-4374-9546-1713C25D2D99}"/>
+                </a:ext>
+              </a:extLst>
+            </p:cNvPr>
+            <p:cNvSpPr txBox="1"/>
+            <p:nvPr/>
+          </p:nvSpPr>
+          <p:spPr>
+            <a:xfrm>
+              <a:off x="4281893" y="112567"/>
+              <a:ext cx="445956" cy="461665"/>
+            </a:xfrm>
+            <a:prstGeom prst="rect">
+              <a:avLst/>
+            </a:prstGeom>
+            <a:noFill/>
+          </p:spPr>
+          <p:txBody>
+            <a:bodyPr wrap="none" rtlCol="0">
+              <a:spAutoFit/>
+            </a:bodyPr>
+            <a:lstStyle/>
+            <a:p>
+              <a:r>
+                <a:rPr lang="en-US" sz="2400" b="1" dirty="0"/>
+                <a:t>b)</a:t>
+              </a:r>
+            </a:p>
+          </p:txBody>
+        </p:sp>
+        <p:sp>
+          <p:nvSpPr>
+            <p:cNvPr id="23" name="TextBox 22">
+              <a:extLst>
+                <a:ext uri="{FF2B5EF4-FFF2-40B4-BE49-F238E27FC236}">
+                  <a16:creationId xmlns:a16="http://schemas.microsoft.com/office/drawing/2014/main" id="{86138AA1-D452-4699-8D7E-919C0865B56F}"/>
+                </a:ext>
+              </a:extLst>
+            </p:cNvPr>
+            <p:cNvSpPr txBox="1"/>
+            <p:nvPr/>
+          </p:nvSpPr>
+          <p:spPr>
+            <a:xfrm>
+              <a:off x="8142713" y="112567"/>
+              <a:ext cx="409086" cy="461665"/>
+            </a:xfrm>
+            <a:prstGeom prst="rect">
+              <a:avLst/>
+            </a:prstGeom>
+            <a:noFill/>
+          </p:spPr>
+          <p:txBody>
+            <a:bodyPr wrap="none" rtlCol="0">
+              <a:spAutoFit/>
+            </a:bodyPr>
+            <a:lstStyle/>
+            <a:p>
+              <a:r>
+                <a:rPr lang="en-US" sz="2400" b="1" dirty="0"/>
+                <a:t>c)</a:t>
+              </a:r>
+            </a:p>
+          </p:txBody>
+        </p:sp>
+      </p:grpSp>
+    </p:spTree>
+    <p:extLst>
+      <p:ext uri="{BB962C8B-B14F-4D97-AF65-F5344CB8AC3E}">
+        <p14:creationId xmlns:p14="http://schemas.microsoft.com/office/powerpoint/2010/main" val="2671148698"/>
+      </p:ext>
+    </p:extLst>
+  </p:cSld>
+  <p:clrMapOvr>
+    <a:masterClrMapping/>
+  </p:clrMapOvr>
+</p:sld>
+</file>
+
+<file path=ppt/slides/slide2.xml><?xml version="1.0" encoding="utf-8"?>
+<p:sld xmlns:a="http://schemas.openxmlformats.org/drawingml/2006/main" xmlns:r="http://schemas.openxmlformats.org/officeDocument/2006/relationships" xmlns:p="http://schemas.openxmlformats.org/presentationml/2006/main">
+  <p:cSld>
+    <p:spTree>
+      <p:nvGrpSpPr>
+        <p:cNvPr id="1" name=""/>
+        <p:cNvGrpSpPr/>
+        <p:nvPr/>
+      </p:nvGrpSpPr>
+      <p:grpSpPr>
+        <a:xfrm>
+          <a:off x="0" y="0"/>
+          <a:ext cx="0" cy="0"/>
+          <a:chOff x="0" y="0"/>
+          <a:chExt cx="0" cy="0"/>
+        </a:xfrm>
+      </p:grpSpPr>
+      <p:grpSp>
+        <p:nvGrpSpPr>
+          <p:cNvPr id="2" name="Group 1">
+            <a:extLst>
+              <a:ext uri="{FF2B5EF4-FFF2-40B4-BE49-F238E27FC236}">
+                <a16:creationId xmlns:a16="http://schemas.microsoft.com/office/drawing/2014/main" id="{05FAF35B-7EAF-464C-888F-B89352A5185A}"/>
+              </a:ext>
+            </a:extLst>
+          </p:cNvPr>
+          <p:cNvGrpSpPr/>
+          <p:nvPr/>
+        </p:nvGrpSpPr>
+        <p:grpSpPr>
+          <a:xfrm>
+            <a:off x="2400994" y="0"/>
+            <a:ext cx="6956880" cy="6690050"/>
+            <a:chOff x="2400994" y="0"/>
+            <a:chExt cx="6956880" cy="6690050"/>
+          </a:xfrm>
+        </p:grpSpPr>
+        <p:grpSp>
+          <p:nvGrpSpPr>
+            <p:cNvPr id="8" name="Group 7">
+              <a:extLst>
+                <a:ext uri="{FF2B5EF4-FFF2-40B4-BE49-F238E27FC236}">
+                  <a16:creationId xmlns:a16="http://schemas.microsoft.com/office/drawing/2014/main" id="{95A94FD1-D1A1-4F39-9740-BEB7614EAA31}"/>
+                </a:ext>
+              </a:extLst>
+            </p:cNvPr>
+            <p:cNvGrpSpPr/>
+            <p:nvPr/>
+          </p:nvGrpSpPr>
+          <p:grpSpPr>
+            <a:xfrm>
+              <a:off x="2834126" y="0"/>
+              <a:ext cx="6523748" cy="6690050"/>
+              <a:chOff x="2834126" y="0"/>
+              <a:chExt cx="6523748" cy="6690050"/>
             </a:xfrm>
           </p:grpSpPr>
           <p:pic>
             <p:nvPicPr>
-              <p:cNvPr id="5" name="Picture 4">
+              <p:cNvPr id="6" name="Picture 5">
                 <a:extLst>
                   <a:ext uri="{FF2B5EF4-FFF2-40B4-BE49-F238E27FC236}">
-                    <a16:creationId xmlns:a16="http://schemas.microsoft.com/office/drawing/2014/main" id="{9BE8C483-620C-45E7-87BC-2E8D3F49C112}"/>
+                    <a16:creationId xmlns:a16="http://schemas.microsoft.com/office/drawing/2014/main" id="{D788D119-CB18-42E5-911E-02AE74A8B697}"/>
                   </a:ext>
                 </a:extLst>
               </p:cNvPr>
@@ -3400,13 +4069,48 @@
                   </a:ext>
                 </a:extLst>
               </a:blip>
-              <a:srcRect l="8945" r="12851"/>
+              <a:srcRect l="4687" t="21811" r="4272" b="8527"/>
               <a:stretch/>
             </p:blipFill>
             <p:spPr>
               <a:xfrm>
-                <a:off x="363895" y="802432"/>
-                <a:ext cx="3181452" cy="5264661"/>
+                <a:off x="3131337" y="0"/>
+                <a:ext cx="5980923" cy="3536302"/>
+              </a:xfrm>
+              <a:prstGeom prst="rect">
+                <a:avLst/>
+              </a:prstGeom>
+            </p:spPr>
+          </p:pic>
+          <p:pic>
+            <p:nvPicPr>
+              <p:cNvPr id="3" name="Picture 2">
+                <a:extLst>
+                  <a:ext uri="{FF2B5EF4-FFF2-40B4-BE49-F238E27FC236}">
+                    <a16:creationId xmlns:a16="http://schemas.microsoft.com/office/drawing/2014/main" id="{75789D56-1360-441C-A437-5919594D23A5}"/>
+                  </a:ext>
+                </a:extLst>
+              </p:cNvPr>
+              <p:cNvPicPr>
+                <a:picLocks noChangeAspect="1"/>
+              </p:cNvPicPr>
+              <p:nvPr/>
+            </p:nvPicPr>
+            <p:blipFill rotWithShape="1">
+              <a:blip r:embed="rId3">
+                <a:extLst>
+                  <a:ext uri="{28A0092B-C50C-407E-A947-70E740481C1C}">
+                    <a14:useLocalDpi xmlns:a14="http://schemas.microsoft.com/office/drawing/2010/main" val="0"/>
+                  </a:ext>
+                </a:extLst>
+              </a:blip>
+              <a:srcRect t="24813" b="12127"/>
+              <a:stretch/>
+            </p:blipFill>
+            <p:spPr>
+              <a:xfrm>
+                <a:off x="2885723" y="3536302"/>
+                <a:ext cx="6472151" cy="3153748"/>
               </a:xfrm>
               <a:prstGeom prst="rect">
                 <a:avLst/>
@@ -3415,10 +4119,10 @@
           </p:pic>
           <p:sp>
             <p:nvSpPr>
-              <p:cNvPr id="12" name="Rectangle 11">
+              <p:cNvPr id="4" name="Rectangle 3">
                 <a:extLst>
                   <a:ext uri="{FF2B5EF4-FFF2-40B4-BE49-F238E27FC236}">
-                    <a16:creationId xmlns:a16="http://schemas.microsoft.com/office/drawing/2014/main" id="{E74F6D24-2B56-4B6E-A9B2-B899F17A0F4E}"/>
+                    <a16:creationId xmlns:a16="http://schemas.microsoft.com/office/drawing/2014/main" id="{F5367724-208A-4279-A82C-62BC5DAB5123}"/>
                   </a:ext>
                 </a:extLst>
               </p:cNvPr>
@@ -3427,8 +4131,8 @@
             </p:nvSpPr>
             <p:spPr>
               <a:xfrm>
-                <a:off x="1446245" y="790907"/>
-                <a:ext cx="2071396" cy="216799"/>
+                <a:off x="3013788" y="2771192"/>
+                <a:ext cx="1586204" cy="839755"/>
               </a:xfrm>
               <a:prstGeom prst="rect">
                 <a:avLst/>
@@ -3469,10 +4173,10 @@
           </p:sp>
           <p:sp>
             <p:nvSpPr>
-              <p:cNvPr id="15" name="Rectangle 14">
+              <p:cNvPr id="10" name="Rectangle 9">
                 <a:extLst>
                   <a:ext uri="{FF2B5EF4-FFF2-40B4-BE49-F238E27FC236}">
-                    <a16:creationId xmlns:a16="http://schemas.microsoft.com/office/drawing/2014/main" id="{5D73DE50-B27C-47C6-BF50-CC6BEAEA7B67}"/>
+                    <a16:creationId xmlns:a16="http://schemas.microsoft.com/office/drawing/2014/main" id="{A42000A4-C3D9-44FF-9A68-DAA5F055B065}"/>
                   </a:ext>
                 </a:extLst>
               </p:cNvPr>
@@ -3481,8 +4185,8 @@
             </p:nvSpPr>
             <p:spPr>
               <a:xfrm>
-                <a:off x="1044886" y="5508171"/>
-                <a:ext cx="1073163" cy="570447"/>
+                <a:off x="2834126" y="5694784"/>
+                <a:ext cx="1586204" cy="839755"/>
               </a:xfrm>
               <a:prstGeom prst="rect">
                 <a:avLst/>
@@ -3522,560 +4226,73 @@
             </p:txBody>
           </p:sp>
         </p:grpSp>
-        <p:grpSp>
-          <p:nvGrpSpPr>
-            <p:cNvPr id="20" name="Group 19">
+        <p:sp>
+          <p:nvSpPr>
+            <p:cNvPr id="7" name="TextBox 6">
               <a:extLst>
                 <a:ext uri="{FF2B5EF4-FFF2-40B4-BE49-F238E27FC236}">
-                  <a16:creationId xmlns:a16="http://schemas.microsoft.com/office/drawing/2014/main" id="{9A0F5850-C511-4E4F-878F-5D407AD76F2D}"/>
+                  <a16:creationId xmlns:a16="http://schemas.microsoft.com/office/drawing/2014/main" id="{8AE89E00-AEAE-4A43-A976-9F4AC281B58A}"/>
                 </a:ext>
               </a:extLst>
             </p:cNvPr>
-            <p:cNvGrpSpPr/>
+            <p:cNvSpPr txBox="1"/>
             <p:nvPr/>
-          </p:nvGrpSpPr>
-          <p:grpSpPr>
-            <a:xfrm>
-              <a:off x="7623098" y="790907"/>
-              <a:ext cx="2930243" cy="5276186"/>
-              <a:chOff x="8696130" y="790907"/>
-              <a:chExt cx="2930243" cy="5276186"/>
-            </a:xfrm>
-          </p:grpSpPr>
-          <p:pic>
-            <p:nvPicPr>
-              <p:cNvPr id="9" name="Picture 8">
-                <a:extLst>
-                  <a:ext uri="{FF2B5EF4-FFF2-40B4-BE49-F238E27FC236}">
-                    <a16:creationId xmlns:a16="http://schemas.microsoft.com/office/drawing/2014/main" id="{5C2B6F29-C485-48A5-A8FB-0404DF95703E}"/>
-                  </a:ext>
-                </a:extLst>
-              </p:cNvPr>
-              <p:cNvPicPr>
-                <a:picLocks noChangeAspect="1"/>
-              </p:cNvPicPr>
-              <p:nvPr/>
-            </p:nvPicPr>
-            <p:blipFill rotWithShape="1">
-              <a:blip r:embed="rId3">
-                <a:extLst>
-                  <a:ext uri="{28A0092B-C50C-407E-A947-70E740481C1C}">
-                    <a14:useLocalDpi xmlns:a14="http://schemas.microsoft.com/office/drawing/2010/main" val="0"/>
-                  </a:ext>
-                </a:extLst>
-              </a:blip>
-              <a:srcRect l="14213" r="13758"/>
-              <a:stretch/>
-            </p:blipFill>
-            <p:spPr>
-              <a:xfrm>
-                <a:off x="8696130" y="802432"/>
-                <a:ext cx="2930243" cy="5264661"/>
-              </a:xfrm>
-              <a:prstGeom prst="rect">
-                <a:avLst/>
-              </a:prstGeom>
-            </p:spPr>
-          </p:pic>
-          <p:sp>
-            <p:nvSpPr>
-              <p:cNvPr id="13" name="Rectangle 12">
-                <a:extLst>
-                  <a:ext uri="{FF2B5EF4-FFF2-40B4-BE49-F238E27FC236}">
-                    <a16:creationId xmlns:a16="http://schemas.microsoft.com/office/drawing/2014/main" id="{A6F8BCA5-F1A3-4775-AE51-A4478CFC9750}"/>
-                  </a:ext>
-                </a:extLst>
-              </p:cNvPr>
-              <p:cNvSpPr/>
-              <p:nvPr/>
-            </p:nvSpPr>
-            <p:spPr>
-              <a:xfrm>
-                <a:off x="9554977" y="790907"/>
-                <a:ext cx="2071396" cy="216799"/>
-              </a:xfrm>
-              <a:prstGeom prst="rect">
-                <a:avLst/>
-              </a:prstGeom>
-              <a:solidFill>
-                <a:schemeClr val="bg1"/>
-              </a:solidFill>
-              <a:ln>
-                <a:solidFill>
-                  <a:schemeClr val="bg1"/>
-                </a:solidFill>
-              </a:ln>
-            </p:spPr>
-            <p:style>
-              <a:lnRef idx="2">
-                <a:schemeClr val="accent1">
-                  <a:shade val="50000"/>
-                </a:schemeClr>
-              </a:lnRef>
-              <a:fillRef idx="1">
-                <a:schemeClr val="accent1"/>
-              </a:fillRef>
-              <a:effectRef idx="0">
-                <a:schemeClr val="accent1"/>
-              </a:effectRef>
-              <a:fontRef idx="minor">
-                <a:schemeClr val="lt1"/>
-              </a:fontRef>
-            </p:style>
-            <p:txBody>
-              <a:bodyPr rtlCol="0" anchor="ctr"/>
-              <a:lstStyle/>
-              <a:p>
-                <a:pPr algn="ctr"/>
-                <a:endParaRPr lang="en-US"/>
-              </a:p>
-            </p:txBody>
-          </p:sp>
-          <p:sp>
-            <p:nvSpPr>
-              <p:cNvPr id="16" name="Rectangle 15">
-                <a:extLst>
-                  <a:ext uri="{FF2B5EF4-FFF2-40B4-BE49-F238E27FC236}">
-                    <a16:creationId xmlns:a16="http://schemas.microsoft.com/office/drawing/2014/main" id="{48F3BB1C-6B0C-4997-8A81-E1D11353E9DD}"/>
-                  </a:ext>
-                </a:extLst>
-              </p:cNvPr>
-              <p:cNvSpPr/>
-              <p:nvPr/>
-            </p:nvSpPr>
-            <p:spPr>
-              <a:xfrm>
-                <a:off x="9352241" y="5561045"/>
-                <a:ext cx="986077" cy="475861"/>
-              </a:xfrm>
-              <a:prstGeom prst="rect">
-                <a:avLst/>
-              </a:prstGeom>
-              <a:solidFill>
-                <a:schemeClr val="bg1"/>
-              </a:solidFill>
-              <a:ln>
-                <a:solidFill>
-                  <a:schemeClr val="bg1"/>
-                </a:solidFill>
-              </a:ln>
-            </p:spPr>
-            <p:style>
-              <a:lnRef idx="2">
-                <a:schemeClr val="accent1">
-                  <a:shade val="50000"/>
-                </a:schemeClr>
-              </a:lnRef>
-              <a:fillRef idx="1">
-                <a:schemeClr val="accent1"/>
-              </a:fillRef>
-              <a:effectRef idx="0">
-                <a:schemeClr val="accent1"/>
-              </a:effectRef>
-              <a:fontRef idx="minor">
-                <a:schemeClr val="lt1"/>
-              </a:fontRef>
-            </p:style>
-            <p:txBody>
-              <a:bodyPr rtlCol="0" anchor="ctr"/>
-              <a:lstStyle/>
-              <a:p>
-                <a:pPr algn="ctr"/>
-                <a:endParaRPr lang="en-US"/>
-              </a:p>
-            </p:txBody>
-          </p:sp>
-        </p:grpSp>
-        <p:grpSp>
-          <p:nvGrpSpPr>
-            <p:cNvPr id="19" name="Group 18">
-              <a:extLst>
-                <a:ext uri="{FF2B5EF4-FFF2-40B4-BE49-F238E27FC236}">
-                  <a16:creationId xmlns:a16="http://schemas.microsoft.com/office/drawing/2014/main" id="{EFE3D198-0CE9-43F8-9070-301002DFCD8F}"/>
-                </a:ext>
-              </a:extLst>
-            </p:cNvPr>
-            <p:cNvGrpSpPr/>
-            <p:nvPr/>
-          </p:nvGrpSpPr>
-          <p:grpSpPr>
-            <a:xfrm>
-              <a:off x="4450702" y="784228"/>
-              <a:ext cx="3181453" cy="5301069"/>
-              <a:chOff x="4450702" y="784228"/>
-              <a:chExt cx="3181453" cy="5301069"/>
-            </a:xfrm>
-          </p:grpSpPr>
-          <p:pic>
-            <p:nvPicPr>
-              <p:cNvPr id="7" name="Picture 6">
-                <a:extLst>
-                  <a:ext uri="{FF2B5EF4-FFF2-40B4-BE49-F238E27FC236}">
-                    <a16:creationId xmlns:a16="http://schemas.microsoft.com/office/drawing/2014/main" id="{E3372117-6F5F-4FB2-9D1E-9068A4286B12}"/>
-                  </a:ext>
-                </a:extLst>
-              </p:cNvPr>
-              <p:cNvPicPr>
-                <a:picLocks noChangeAspect="1"/>
-              </p:cNvPicPr>
-              <p:nvPr/>
-            </p:nvPicPr>
-            <p:blipFill rotWithShape="1">
-              <a:blip r:embed="rId4">
-                <a:extLst>
-                  <a:ext uri="{28A0092B-C50C-407E-A947-70E740481C1C}">
-                    <a14:useLocalDpi xmlns:a14="http://schemas.microsoft.com/office/drawing/2010/main" val="0"/>
-                  </a:ext>
-                </a:extLst>
-              </a:blip>
-              <a:srcRect l="9630" r="12167"/>
-              <a:stretch/>
-            </p:blipFill>
-            <p:spPr>
-              <a:xfrm>
-                <a:off x="4450702" y="802432"/>
-                <a:ext cx="3181453" cy="5264661"/>
-              </a:xfrm>
-              <a:prstGeom prst="rect">
-                <a:avLst/>
-              </a:prstGeom>
-            </p:spPr>
-          </p:pic>
-          <p:sp>
-            <p:nvSpPr>
-              <p:cNvPr id="14" name="Rectangle 13">
-                <a:extLst>
-                  <a:ext uri="{FF2B5EF4-FFF2-40B4-BE49-F238E27FC236}">
-                    <a16:creationId xmlns:a16="http://schemas.microsoft.com/office/drawing/2014/main" id="{ABEA1C05-4EC4-466C-9D9F-9FB2AC52530C}"/>
-                  </a:ext>
-                </a:extLst>
-              </p:cNvPr>
-              <p:cNvSpPr/>
-              <p:nvPr/>
-            </p:nvSpPr>
-            <p:spPr>
-              <a:xfrm>
-                <a:off x="5496017" y="784228"/>
-                <a:ext cx="2071396" cy="216799"/>
-              </a:xfrm>
-              <a:prstGeom prst="rect">
-                <a:avLst/>
-              </a:prstGeom>
-              <a:solidFill>
-                <a:schemeClr val="bg1"/>
-              </a:solidFill>
-              <a:ln>
-                <a:solidFill>
-                  <a:schemeClr val="bg1"/>
-                </a:solidFill>
-              </a:ln>
-            </p:spPr>
-            <p:style>
-              <a:lnRef idx="2">
-                <a:schemeClr val="accent1">
-                  <a:shade val="50000"/>
-                </a:schemeClr>
-              </a:lnRef>
-              <a:fillRef idx="1">
-                <a:schemeClr val="accent1"/>
-              </a:fillRef>
-              <a:effectRef idx="0">
-                <a:schemeClr val="accent1"/>
-              </a:effectRef>
-              <a:fontRef idx="minor">
-                <a:schemeClr val="lt1"/>
-              </a:fontRef>
-            </p:style>
-            <p:txBody>
-              <a:bodyPr rtlCol="0" anchor="ctr"/>
-              <a:lstStyle/>
-              <a:p>
-                <a:pPr algn="ctr"/>
-                <a:endParaRPr lang="en-US"/>
-              </a:p>
-            </p:txBody>
-          </p:sp>
-          <p:sp>
-            <p:nvSpPr>
-              <p:cNvPr id="17" name="Rectangle 16">
-                <a:extLst>
-                  <a:ext uri="{FF2B5EF4-FFF2-40B4-BE49-F238E27FC236}">
-                    <a16:creationId xmlns:a16="http://schemas.microsoft.com/office/drawing/2014/main" id="{7215AE6B-75C9-42DA-BD49-3E9576AB0E84}"/>
-                  </a:ext>
-                </a:extLst>
-              </p:cNvPr>
-              <p:cNvSpPr/>
-              <p:nvPr/>
-            </p:nvSpPr>
-            <p:spPr>
-              <a:xfrm>
-                <a:off x="5094514" y="5551714"/>
-                <a:ext cx="979716" cy="533583"/>
-              </a:xfrm>
-              <a:prstGeom prst="rect">
-                <a:avLst/>
-              </a:prstGeom>
-              <a:solidFill>
-                <a:schemeClr val="bg1"/>
-              </a:solidFill>
-              <a:ln>
-                <a:solidFill>
-                  <a:schemeClr val="bg1"/>
-                </a:solidFill>
-              </a:ln>
-            </p:spPr>
-            <p:style>
-              <a:lnRef idx="2">
-                <a:schemeClr val="accent1">
-                  <a:shade val="50000"/>
-                </a:schemeClr>
-              </a:lnRef>
-              <a:fillRef idx="1">
-                <a:schemeClr val="accent1"/>
-              </a:fillRef>
-              <a:effectRef idx="0">
-                <a:schemeClr val="accent1"/>
-              </a:effectRef>
-              <a:fontRef idx="minor">
-                <a:schemeClr val="lt1"/>
-              </a:fontRef>
-            </p:style>
-            <p:txBody>
-              <a:bodyPr rtlCol="0" anchor="ctr"/>
-              <a:lstStyle/>
-              <a:p>
-                <a:pPr algn="ctr"/>
-                <a:endParaRPr lang="en-US"/>
-              </a:p>
-            </p:txBody>
-          </p:sp>
-        </p:grpSp>
-      </p:grpSp>
-    </p:spTree>
-    <p:extLst>
-      <p:ext uri="{BB962C8B-B14F-4D97-AF65-F5344CB8AC3E}">
-        <p14:creationId xmlns:p14="http://schemas.microsoft.com/office/powerpoint/2010/main" val="2671148698"/>
-      </p:ext>
-    </p:extLst>
-  </p:cSld>
-  <p:clrMapOvr>
-    <a:masterClrMapping/>
-  </p:clrMapOvr>
-</p:sld>
-</file>
-
-<file path=ppt/slides/slide2.xml><?xml version="1.0" encoding="utf-8"?>
-<p:sld xmlns:a="http://schemas.openxmlformats.org/drawingml/2006/main" xmlns:r="http://schemas.openxmlformats.org/officeDocument/2006/relationships" xmlns:p="http://schemas.openxmlformats.org/presentationml/2006/main">
-  <p:cSld>
-    <p:spTree>
-      <p:nvGrpSpPr>
-        <p:cNvPr id="1" name=""/>
-        <p:cNvGrpSpPr/>
-        <p:nvPr/>
-      </p:nvGrpSpPr>
-      <p:grpSpPr>
-        <a:xfrm>
-          <a:off x="0" y="0"/>
-          <a:ext cx="0" cy="0"/>
-          <a:chOff x="0" y="0"/>
-          <a:chExt cx="0" cy="0"/>
-        </a:xfrm>
-      </p:grpSpPr>
-      <p:grpSp>
-        <p:nvGrpSpPr>
-          <p:cNvPr id="8" name="Group 7">
-            <a:extLst>
-              <a:ext uri="{FF2B5EF4-FFF2-40B4-BE49-F238E27FC236}">
-                <a16:creationId xmlns:a16="http://schemas.microsoft.com/office/drawing/2014/main" id="{95A94FD1-D1A1-4F39-9740-BEB7614EAA31}"/>
-              </a:ext>
-            </a:extLst>
-          </p:cNvPr>
-          <p:cNvGrpSpPr/>
-          <p:nvPr/>
-        </p:nvGrpSpPr>
-        <p:grpSpPr>
-          <a:xfrm>
-            <a:off x="2834126" y="0"/>
-            <a:ext cx="6523748" cy="6690050"/>
-            <a:chOff x="2834126" y="0"/>
-            <a:chExt cx="6523748" cy="6690050"/>
-          </a:xfrm>
-        </p:grpSpPr>
-        <p:pic>
-          <p:nvPicPr>
-            <p:cNvPr id="6" name="Picture 5">
-              <a:extLst>
-                <a:ext uri="{FF2B5EF4-FFF2-40B4-BE49-F238E27FC236}">
-                  <a16:creationId xmlns:a16="http://schemas.microsoft.com/office/drawing/2014/main" id="{D788D119-CB18-42E5-911E-02AE74A8B697}"/>
-                </a:ext>
-              </a:extLst>
-            </p:cNvPr>
-            <p:cNvPicPr>
-              <a:picLocks noChangeAspect="1"/>
-            </p:cNvPicPr>
-            <p:nvPr/>
-          </p:nvPicPr>
-          <p:blipFill rotWithShape="1">
-            <a:blip r:embed="rId2">
-              <a:extLst>
-                <a:ext uri="{28A0092B-C50C-407E-A947-70E740481C1C}">
-                  <a14:useLocalDpi xmlns:a14="http://schemas.microsoft.com/office/drawing/2010/main" val="0"/>
-                </a:ext>
-              </a:extLst>
-            </a:blip>
-            <a:srcRect l="4687" t="21811" r="4272" b="8527"/>
-            <a:stretch/>
-          </p:blipFill>
+          </p:nvSpPr>
           <p:spPr>
             <a:xfrm>
-              <a:off x="3131337" y="0"/>
-              <a:ext cx="5980923" cy="3536302"/>
+              <a:off x="2400994" y="323461"/>
+              <a:ext cx="433132" cy="461665"/>
             </a:xfrm>
             <a:prstGeom prst="rect">
               <a:avLst/>
             </a:prstGeom>
+            <a:noFill/>
           </p:spPr>
-        </p:pic>
-        <p:pic>
-          <p:nvPicPr>
-            <p:cNvPr id="3" name="Picture 2">
-              <a:extLst>
-                <a:ext uri="{FF2B5EF4-FFF2-40B4-BE49-F238E27FC236}">
-                  <a16:creationId xmlns:a16="http://schemas.microsoft.com/office/drawing/2014/main" id="{75789D56-1360-441C-A437-5919594D23A5}"/>
-                </a:ext>
-              </a:extLst>
-            </p:cNvPr>
-            <p:cNvPicPr>
-              <a:picLocks noChangeAspect="1"/>
-            </p:cNvPicPr>
-            <p:nvPr/>
-          </p:nvPicPr>
-          <p:blipFill rotWithShape="1">
-            <a:blip r:embed="rId3">
-              <a:extLst>
-                <a:ext uri="{28A0092B-C50C-407E-A947-70E740481C1C}">
-                  <a14:useLocalDpi xmlns:a14="http://schemas.microsoft.com/office/drawing/2010/main" val="0"/>
-                </a:ext>
-              </a:extLst>
-            </a:blip>
-            <a:srcRect t="24813" b="12127"/>
-            <a:stretch/>
-          </p:blipFill>
-          <p:spPr>
-            <a:xfrm>
-              <a:off x="2885723" y="3536302"/>
-              <a:ext cx="6472151" cy="3153748"/>
-            </a:xfrm>
-            <a:prstGeom prst="rect">
-              <a:avLst/>
-            </a:prstGeom>
-          </p:spPr>
-        </p:pic>
-        <p:sp>
-          <p:nvSpPr>
-            <p:cNvPr id="4" name="Rectangle 3">
-              <a:extLst>
-                <a:ext uri="{FF2B5EF4-FFF2-40B4-BE49-F238E27FC236}">
-                  <a16:creationId xmlns:a16="http://schemas.microsoft.com/office/drawing/2014/main" id="{F5367724-208A-4279-A82C-62BC5DAB5123}"/>
-                </a:ext>
-              </a:extLst>
-            </p:cNvPr>
-            <p:cNvSpPr/>
-            <p:nvPr/>
-          </p:nvSpPr>
-          <p:spPr>
-            <a:xfrm>
-              <a:off x="3013788" y="2771192"/>
-              <a:ext cx="1586204" cy="839755"/>
-            </a:xfrm>
-            <a:prstGeom prst="rect">
-              <a:avLst/>
-            </a:prstGeom>
-            <a:solidFill>
-              <a:schemeClr val="bg1"/>
-            </a:solidFill>
-            <a:ln>
-              <a:solidFill>
-                <a:schemeClr val="bg1"/>
-              </a:solidFill>
-            </a:ln>
-          </p:spPr>
-          <p:style>
-            <a:lnRef idx="2">
-              <a:schemeClr val="accent1">
-                <a:shade val="50000"/>
-              </a:schemeClr>
-            </a:lnRef>
-            <a:fillRef idx="1">
-              <a:schemeClr val="accent1"/>
-            </a:fillRef>
-            <a:effectRef idx="0">
-              <a:schemeClr val="accent1"/>
-            </a:effectRef>
-            <a:fontRef idx="minor">
-              <a:schemeClr val="lt1"/>
-            </a:fontRef>
-          </p:style>
           <p:txBody>
-            <a:bodyPr rtlCol="0" anchor="ctr"/>
+            <a:bodyPr wrap="none" rtlCol="0">
+              <a:spAutoFit/>
+            </a:bodyPr>
             <a:lstStyle/>
             <a:p>
-              <a:pPr algn="ctr"/>
-              <a:endParaRPr lang="en-US"/>
+              <a:r>
+                <a:rPr lang="en-US" sz="2400" b="1" dirty="0"/>
+                <a:t>a)</a:t>
+              </a:r>
             </a:p>
           </p:txBody>
         </p:sp>
         <p:sp>
           <p:nvSpPr>
-            <p:cNvPr id="10" name="Rectangle 9">
+            <p:cNvPr id="9" name="TextBox 8">
               <a:extLst>
                 <a:ext uri="{FF2B5EF4-FFF2-40B4-BE49-F238E27FC236}">
-                  <a16:creationId xmlns:a16="http://schemas.microsoft.com/office/drawing/2014/main" id="{A42000A4-C3D9-44FF-9A68-DAA5F055B065}"/>
+                  <a16:creationId xmlns:a16="http://schemas.microsoft.com/office/drawing/2014/main" id="{FA66FDC4-0E59-4788-BBFA-B0B3D9C70352}"/>
                 </a:ext>
               </a:extLst>
             </p:cNvPr>
-            <p:cNvSpPr/>
+            <p:cNvSpPr txBox="1"/>
             <p:nvPr/>
           </p:nvSpPr>
           <p:spPr>
             <a:xfrm>
-              <a:off x="2834126" y="5694784"/>
-              <a:ext cx="1586204" cy="839755"/>
+              <a:off x="2423543" y="3429000"/>
+              <a:ext cx="445956" cy="461665"/>
             </a:xfrm>
             <a:prstGeom prst="rect">
               <a:avLst/>
             </a:prstGeom>
-            <a:solidFill>
-              <a:schemeClr val="bg1"/>
-            </a:solidFill>
-            <a:ln>
-              <a:solidFill>
-                <a:schemeClr val="bg1"/>
-              </a:solidFill>
-            </a:ln>
+            <a:noFill/>
           </p:spPr>
-          <p:style>
-            <a:lnRef idx="2">
-              <a:schemeClr val="accent1">
-                <a:shade val="50000"/>
-              </a:schemeClr>
-            </a:lnRef>
-            <a:fillRef idx="1">
-              <a:schemeClr val="accent1"/>
-            </a:fillRef>
-            <a:effectRef idx="0">
-              <a:schemeClr val="accent1"/>
-            </a:effectRef>
-            <a:fontRef idx="minor">
-              <a:schemeClr val="lt1"/>
-            </a:fontRef>
-          </p:style>
           <p:txBody>
-            <a:bodyPr rtlCol="0" anchor="ctr"/>
+            <a:bodyPr wrap="none" rtlCol="0">
+              <a:spAutoFit/>
+            </a:bodyPr>
             <a:lstStyle/>
             <a:p>
-              <a:pPr algn="ctr"/>
-              <a:endParaRPr lang="en-US"/>
+              <a:r>
+                <a:rPr lang="en-US" sz="2400" b="1" dirty="0"/>
+                <a:t>b)</a:t>
+              </a:r>
             </a:p>
           </p:txBody>
         </p:sp>

</xml_diff>